<commit_message>
Inserindo anotações no ppt
</commit_message>
<xml_diff>
--- a/Apresentação.pptx
+++ b/Apresentação.pptx
@@ -24,12 +24,12 @@
   <p:notesSz cx="6858000" cy="9144000"/>
   <p:embeddedFontLst>
     <p:embeddedFont>
-      <p:font typeface="Didact Gothic" panose="020B0604020202020204" charset="0"/>
-      <p:regular r:id="rId14"/>
+      <p:font typeface="Brush Script MT" panose="03060802040406070304" pitchFamily="66" charset="0"/>
+      <p:italic r:id="rId14"/>
     </p:embeddedFont>
     <p:embeddedFont>
-      <p:font typeface="Brush Script MT" panose="03060802040406070304" pitchFamily="66" charset="0"/>
-      <p:italic r:id="rId15"/>
+      <p:font typeface="Didact Gothic" panose="020B0604020202020204" charset="0"/>
+      <p:regular r:id="rId15"/>
     </p:embeddedFont>
     <p:embeddedFont>
       <p:font typeface="Michroma" panose="020B0604020202020204" charset="0"/>
@@ -815,6 +815,56 @@
               <a:rPr lang="pt-BR" dirty="0"/>
               <a:t>Thais</a:t>
             </a:r>
+          </a:p>
+          <a:p>
+            <a:pPr marL="0" lvl="0" indent="0" algn="l" rtl="0">
+              <a:spcBef>
+                <a:spcPts val="0"/>
+              </a:spcBef>
+              <a:spcAft>
+                <a:spcPts val="0"/>
+              </a:spcAft>
+              <a:buNone/>
+            </a:pPr>
+            <a:endParaRPr lang="pt-BR" dirty="0"/>
+          </a:p>
+          <a:p>
+            <a:pPr marL="0" lvl="0" indent="0" algn="l" rtl="0">
+              <a:spcBef>
+                <a:spcPts val="0"/>
+              </a:spcBef>
+              <a:spcAft>
+                <a:spcPts val="0"/>
+              </a:spcAft>
+              <a:buNone/>
+            </a:pPr>
+            <a:r>
+              <a:rPr lang="pt-BR" dirty="0"/>
+              <a:t>Olá, boa noite a todos. </a:t>
+            </a:r>
+          </a:p>
+          <a:p>
+            <a:pPr marL="0" lvl="0" indent="0" algn="l" rtl="0">
+              <a:spcBef>
+                <a:spcPts val="0"/>
+              </a:spcBef>
+              <a:spcAft>
+                <a:spcPts val="0"/>
+              </a:spcAft>
+              <a:buNone/>
+            </a:pPr>
+            <a:r>
+              <a:rPr lang="pt-BR" dirty="0"/>
+              <a:t>Nós somos a empresa </a:t>
+            </a:r>
+            <a:r>
+              <a:rPr lang="pt-BR" dirty="0" err="1"/>
+              <a:t>Geli’s</a:t>
+            </a:r>
+            <a:r>
+              <a:rPr lang="pt-BR" dirty="0"/>
+              <a:t> e estamos aqui para garantir o monitoramento do hardware do seu computador enquanto seus vídeos são renderizados.</a:t>
+            </a:r>
             <a:endParaRPr dirty="0"/>
           </a:p>
         </p:txBody>
@@ -1165,6 +1215,68 @@
               <a:rPr lang="pt-BR" dirty="0"/>
               <a:t>Thais</a:t>
             </a:r>
+          </a:p>
+          <a:p>
+            <a:pPr marL="0" lvl="0" indent="0" algn="l" rtl="0">
+              <a:spcBef>
+                <a:spcPts val="0"/>
+              </a:spcBef>
+              <a:spcAft>
+                <a:spcPts val="0"/>
+              </a:spcAft>
+              <a:buNone/>
+            </a:pPr>
+            <a:endParaRPr lang="pt-BR" dirty="0"/>
+          </a:p>
+          <a:p>
+            <a:pPr marL="0" lvl="0" indent="0" algn="l" rtl="0">
+              <a:spcBef>
+                <a:spcPts val="0"/>
+              </a:spcBef>
+              <a:spcAft>
+                <a:spcPts val="0"/>
+              </a:spcAft>
+              <a:buNone/>
+            </a:pPr>
+            <a:r>
+              <a:rPr lang="pt-BR" dirty="0"/>
+              <a:t>Nossa equipe é composta pelos seguintes integrantes: &lt;nomes&gt;&lt;/nomes&gt;</a:t>
+            </a:r>
+          </a:p>
+          <a:p>
+            <a:pPr marL="0" lvl="0" indent="0" algn="l" rtl="0">
+              <a:spcBef>
+                <a:spcPts val="0"/>
+              </a:spcBef>
+              <a:spcAft>
+                <a:spcPts val="0"/>
+              </a:spcAft>
+              <a:buNone/>
+            </a:pPr>
+            <a:endParaRPr lang="pt-BR" dirty="0"/>
+          </a:p>
+          <a:p>
+            <a:pPr marL="0" lvl="0" indent="0" algn="l" rtl="0">
+              <a:spcBef>
+                <a:spcPts val="0"/>
+              </a:spcBef>
+              <a:spcAft>
+                <a:spcPts val="0"/>
+              </a:spcAft>
+              <a:buNone/>
+            </a:pPr>
+            <a:r>
+              <a:rPr lang="pt-BR" dirty="0"/>
+              <a:t>Agora passarei a fala para o Gabriel que irá falar a respeito da nossa contextualização de negocio e nosso </a:t>
+            </a:r>
+            <a:r>
+              <a:rPr lang="pt-BR" dirty="0" err="1"/>
+              <a:t>storyboard</a:t>
+            </a:r>
+            <a:r>
+              <a:rPr lang="pt-BR" dirty="0"/>
+              <a:t>.</a:t>
+            </a:r>
             <a:endParaRPr dirty="0"/>
           </a:p>
         </p:txBody>
@@ -1344,9 +1456,50 @@
           <a:bodyPr/>
           <a:lstStyle/>
           <a:p>
+            <a:pPr marL="158750" indent="0">
+              <a:buNone/>
+            </a:pPr>
             <a:r>
               <a:rPr lang="pt-BR" dirty="0"/>
               <a:t>Thais</a:t>
+            </a:r>
+          </a:p>
+          <a:p>
+            <a:pPr marL="158750" indent="0">
+              <a:buNone/>
+            </a:pPr>
+            <a:endParaRPr lang="pt-BR" dirty="0"/>
+          </a:p>
+          <a:p>
+            <a:pPr marL="158750" indent="0">
+              <a:buNone/>
+            </a:pPr>
+            <a:r>
+              <a:rPr lang="pt-BR" dirty="0"/>
+              <a:t>Com o objetivo de traçar melhor as dores, necessidades, comportamento e motivações do nosso cliente. Criamos a nossa </a:t>
+            </a:r>
+            <a:r>
+              <a:rPr lang="pt-BR" dirty="0" err="1"/>
+              <a:t>protopersona</a:t>
+            </a:r>
+            <a:r>
+              <a:rPr lang="pt-BR" dirty="0"/>
+              <a:t>, que será nossa representação de personagem fictício que utilizará nossa solução.  </a:t>
+            </a:r>
+          </a:p>
+          <a:p>
+            <a:pPr marL="158750" indent="0">
+              <a:buNone/>
+            </a:pPr>
+            <a:endParaRPr lang="pt-BR" dirty="0"/>
+          </a:p>
+          <a:p>
+            <a:pPr marL="158750" indent="0">
+              <a:buNone/>
+            </a:pPr>
+            <a:r>
+              <a:rPr lang="pt-BR" i="1" dirty="0"/>
+              <a:t>Começar por Palavras e Frases &gt; Dores e Necessidades &gt; Quem?</a:t>
             </a:r>
           </a:p>
         </p:txBody>
@@ -4140,7 +4293,7 @@
                 <a:hlinkClick r:id="rId2">
                   <a:extLst>
                     <a:ext uri="{A12FA001-AC4F-418D-AE19-62706E023703}">
-                      <ahyp:hlinkClr xmlns:ahyp="http://schemas.microsoft.com/office/drawing/2018/hyperlinkcolor" xmlns="" val="tx"/>
+                      <ahyp:hlinkClr xmlns:ahyp="http://schemas.microsoft.com/office/drawing/2018/hyperlinkcolor" val="tx"/>
                     </a:ext>
                   </a:extLst>
                 </a:hlinkClick>
@@ -4174,7 +4327,7 @@
                 <a:hlinkClick r:id="rId3">
                   <a:extLst>
                     <a:ext uri="{A12FA001-AC4F-418D-AE19-62706E023703}">
-                      <ahyp:hlinkClr xmlns:ahyp="http://schemas.microsoft.com/office/drawing/2018/hyperlinkcolor" xmlns="" val="tx"/>
+                      <ahyp:hlinkClr xmlns:ahyp="http://schemas.microsoft.com/office/drawing/2018/hyperlinkcolor" val="tx"/>
                     </a:ext>
                   </a:extLst>
                 </a:hlinkClick>
@@ -4208,7 +4361,7 @@
                 <a:hlinkClick r:id="rId4">
                   <a:extLst>
                     <a:ext uri="{A12FA001-AC4F-418D-AE19-62706E023703}">
-                      <ahyp:hlinkClr xmlns:ahyp="http://schemas.microsoft.com/office/drawing/2018/hyperlinkcolor" xmlns="" val="tx"/>
+                      <ahyp:hlinkClr xmlns:ahyp="http://schemas.microsoft.com/office/drawing/2018/hyperlinkcolor" val="tx"/>
                     </a:ext>
                   </a:extLst>
                 </a:hlinkClick>
@@ -11094,7 +11247,7 @@
           <p:cNvPr id="10" name="Imagem 9" descr="Desenho com traços pretos em fundo branco&#10;&#10;Descrição gerada automaticamente com confiança baixa">
             <a:extLst>
               <a:ext uri="{FF2B5EF4-FFF2-40B4-BE49-F238E27FC236}">
-                <a16:creationId xmlns:a16="http://schemas.microsoft.com/office/drawing/2014/main" xmlns="" id="{71756BF8-A283-4F27-B2A8-51EBC71121CF}"/>
+                <a16:creationId xmlns:a16="http://schemas.microsoft.com/office/drawing/2014/main" id="{71756BF8-A283-4F27-B2A8-51EBC71121CF}"/>
               </a:ext>
             </a:extLst>
           </p:cNvPr>
@@ -11800,7 +11953,7 @@
           <p:cNvPr id="3" name="Imagem 2">
             <a:extLst>
               <a:ext uri="{FF2B5EF4-FFF2-40B4-BE49-F238E27FC236}">
-                <a16:creationId xmlns:a16="http://schemas.microsoft.com/office/drawing/2014/main" xmlns="" id="{4D0B2BF1-B08C-422A-8BE5-3C2DFDCA1225}"/>
+                <a16:creationId xmlns:a16="http://schemas.microsoft.com/office/drawing/2014/main" id="{4D0B2BF1-B08C-422A-8BE5-3C2DFDCA1225}"/>
               </a:ext>
             </a:extLst>
           </p:cNvPr>
@@ -12072,7 +12225,7 @@
           <p:cNvPr id="6" name="Retângulo 5">
             <a:extLst>
               <a:ext uri="{FF2B5EF4-FFF2-40B4-BE49-F238E27FC236}">
-                <a16:creationId xmlns:a16="http://schemas.microsoft.com/office/drawing/2014/main" xmlns="" id="{9590ADF8-6AFF-4C6B-92F7-E44DA4715CD0}"/>
+                <a16:creationId xmlns:a16="http://schemas.microsoft.com/office/drawing/2014/main" id="{9590ADF8-6AFF-4C6B-92F7-E44DA4715CD0}"/>
               </a:ext>
             </a:extLst>
           </p:cNvPr>
@@ -12118,7 +12271,7 @@
           <p:cNvPr id="3" name="Imagem 2" descr="Logotipo&#10;&#10;Descrição gerada automaticamente">
             <a:extLst>
               <a:ext uri="{FF2B5EF4-FFF2-40B4-BE49-F238E27FC236}">
-                <a16:creationId xmlns:a16="http://schemas.microsoft.com/office/drawing/2014/main" xmlns="" id="{FADC4038-F57E-4F7D-ADC3-0B909A05A33B}"/>
+                <a16:creationId xmlns:a16="http://schemas.microsoft.com/office/drawing/2014/main" id="{FADC4038-F57E-4F7D-ADC3-0B909A05A33B}"/>
               </a:ext>
             </a:extLst>
           </p:cNvPr>
@@ -12148,7 +12301,7 @@
           <p:cNvPr id="18" name="Google Shape;894;p73">
             <a:extLst>
               <a:ext uri="{FF2B5EF4-FFF2-40B4-BE49-F238E27FC236}">
-                <a16:creationId xmlns:a16="http://schemas.microsoft.com/office/drawing/2014/main" xmlns="" id="{0FD784DE-A7F8-4B82-9CBA-85AFDB66D5CA}"/>
+                <a16:creationId xmlns:a16="http://schemas.microsoft.com/office/drawing/2014/main" id="{0FD784DE-A7F8-4B82-9CBA-85AFDB66D5CA}"/>
               </a:ext>
             </a:extLst>
           </p:cNvPr>
@@ -12198,7 +12351,7 @@
           <p:cNvPr id="5" name="Imagem 4" descr="Logotipo&#10;&#10;Descrição gerada automaticamente">
             <a:extLst>
               <a:ext uri="{FF2B5EF4-FFF2-40B4-BE49-F238E27FC236}">
-                <a16:creationId xmlns:a16="http://schemas.microsoft.com/office/drawing/2014/main" xmlns="" id="{893A936E-20B5-42F0-B003-402A90E58F9A}"/>
+                <a16:creationId xmlns:a16="http://schemas.microsoft.com/office/drawing/2014/main" id="{893A936E-20B5-42F0-B003-402A90E58F9A}"/>
               </a:ext>
             </a:extLst>
           </p:cNvPr>
@@ -12250,7 +12403,7 @@
           <p:cNvPr id="21" name="Google Shape;894;p73">
             <a:extLst>
               <a:ext uri="{FF2B5EF4-FFF2-40B4-BE49-F238E27FC236}">
-                <a16:creationId xmlns:a16="http://schemas.microsoft.com/office/drawing/2014/main" xmlns="" id="{640D94A8-1216-45C5-A607-1536378FE2F0}"/>
+                <a16:creationId xmlns:a16="http://schemas.microsoft.com/office/drawing/2014/main" id="{640D94A8-1216-45C5-A607-1536378FE2F0}"/>
               </a:ext>
             </a:extLst>
           </p:cNvPr>
@@ -12300,7 +12453,7 @@
           <p:cNvPr id="2" name="Retângulo 1">
             <a:extLst>
               <a:ext uri="{FF2B5EF4-FFF2-40B4-BE49-F238E27FC236}">
-                <a16:creationId xmlns:a16="http://schemas.microsoft.com/office/drawing/2014/main" xmlns="" id="{763DB53B-4A1B-4006-BC38-A9D6DEAD6E27}"/>
+                <a16:creationId xmlns:a16="http://schemas.microsoft.com/office/drawing/2014/main" id="{763DB53B-4A1B-4006-BC38-A9D6DEAD6E27}"/>
               </a:ext>
             </a:extLst>
           </p:cNvPr>
@@ -12346,7 +12499,7 @@
           <p:cNvPr id="7" name="Imagem 6" descr="Desenho com traços pretos em fundo branco&#10;&#10;Descrição gerada automaticamente com confiança baixa">
             <a:extLst>
               <a:ext uri="{FF2B5EF4-FFF2-40B4-BE49-F238E27FC236}">
-                <a16:creationId xmlns:a16="http://schemas.microsoft.com/office/drawing/2014/main" xmlns="" id="{2870108A-08B9-4FB6-8B53-394D832035AA}"/>
+                <a16:creationId xmlns:a16="http://schemas.microsoft.com/office/drawing/2014/main" id="{2870108A-08B9-4FB6-8B53-394D832035AA}"/>
               </a:ext>
             </a:extLst>
           </p:cNvPr>
@@ -12376,7 +12529,7 @@
           <p:cNvPr id="9" name="CaixaDeTexto 8">
             <a:extLst>
               <a:ext uri="{FF2B5EF4-FFF2-40B4-BE49-F238E27FC236}">
-                <a16:creationId xmlns:a16="http://schemas.microsoft.com/office/drawing/2014/main" xmlns="" id="{82EA96C9-9457-4663-95D6-8DBE7CDE52B9}"/>
+                <a16:creationId xmlns:a16="http://schemas.microsoft.com/office/drawing/2014/main" id="{82EA96C9-9457-4663-95D6-8DBE7CDE52B9}"/>
               </a:ext>
             </a:extLst>
           </p:cNvPr>
@@ -12415,7 +12568,7 @@
           <p:cNvPr id="19" name="Google Shape;9442;p90">
             <a:extLst>
               <a:ext uri="{FF2B5EF4-FFF2-40B4-BE49-F238E27FC236}">
-                <a16:creationId xmlns:a16="http://schemas.microsoft.com/office/drawing/2014/main" xmlns="" id="{0F10B794-8545-4939-A269-8FDE5D06159A}"/>
+                <a16:creationId xmlns:a16="http://schemas.microsoft.com/office/drawing/2014/main" id="{0F10B794-8545-4939-A269-8FDE5D06159A}"/>
               </a:ext>
             </a:extLst>
           </p:cNvPr>
@@ -12753,7 +12906,7 @@
           <p:cNvPr id="3" name="Imagem 2" descr="Desenho com traços pretos em fundo branco&#10;&#10;Descrição gerada automaticamente com confiança baixa">
             <a:extLst>
               <a:ext uri="{FF2B5EF4-FFF2-40B4-BE49-F238E27FC236}">
-                <a16:creationId xmlns:a16="http://schemas.microsoft.com/office/drawing/2014/main" xmlns="" id="{B4DC6BF9-6BD6-4AFF-9859-9FD26ABFCDDF}"/>
+                <a16:creationId xmlns:a16="http://schemas.microsoft.com/office/drawing/2014/main" id="{B4DC6BF9-6BD6-4AFF-9859-9FD26ABFCDDF}"/>
               </a:ext>
             </a:extLst>
           </p:cNvPr>
@@ -12783,7 +12936,7 @@
           <p:cNvPr id="7" name="Imagem 6" descr="Foto editada de homem com óculos de grau&#10;&#10;Descrição gerada automaticamente">
             <a:extLst>
               <a:ext uri="{FF2B5EF4-FFF2-40B4-BE49-F238E27FC236}">
-                <a16:creationId xmlns:a16="http://schemas.microsoft.com/office/drawing/2014/main" xmlns="" id="{67D53509-AEA2-4729-994A-DA0FA518DB76}"/>
+                <a16:creationId xmlns:a16="http://schemas.microsoft.com/office/drawing/2014/main" id="{67D53509-AEA2-4729-994A-DA0FA518DB76}"/>
               </a:ext>
             </a:extLst>
           </p:cNvPr>
@@ -12857,7 +13010,7 @@
           <p:cNvPr id="9" name="Imagem 8" descr="Tela de celular com foto de homem&#10;&#10;Descrição gerada automaticamente com confiança média">
             <a:extLst>
               <a:ext uri="{FF2B5EF4-FFF2-40B4-BE49-F238E27FC236}">
-                <a16:creationId xmlns:a16="http://schemas.microsoft.com/office/drawing/2014/main" xmlns="" id="{B1DCEF26-ABE1-4ED1-A39E-9A710624C1AA}"/>
+                <a16:creationId xmlns:a16="http://schemas.microsoft.com/office/drawing/2014/main" id="{B1DCEF26-ABE1-4ED1-A39E-9A710624C1AA}"/>
               </a:ext>
             </a:extLst>
           </p:cNvPr>
@@ -12935,7 +13088,7 @@
           <p:cNvPr id="23" name="Imagem 22" descr="Desenho de uma pessoa&#10;&#10;Descrição gerada automaticamente com confiança média">
             <a:extLst>
               <a:ext uri="{FF2B5EF4-FFF2-40B4-BE49-F238E27FC236}">
-                <a16:creationId xmlns:a16="http://schemas.microsoft.com/office/drawing/2014/main" xmlns="" id="{AAE81B5D-3D43-4958-8696-FCC846D1203A}"/>
+                <a16:creationId xmlns:a16="http://schemas.microsoft.com/office/drawing/2014/main" id="{AAE81B5D-3D43-4958-8696-FCC846D1203A}"/>
               </a:ext>
             </a:extLst>
           </p:cNvPr>
@@ -12965,7 +13118,7 @@
           <p:cNvPr id="24" name="Google Shape;892;p73">
             <a:extLst>
               <a:ext uri="{FF2B5EF4-FFF2-40B4-BE49-F238E27FC236}">
-                <a16:creationId xmlns:a16="http://schemas.microsoft.com/office/drawing/2014/main" xmlns="" id="{5921E98B-0DD7-40EF-87E0-5D235D17ADB9}"/>
+                <a16:creationId xmlns:a16="http://schemas.microsoft.com/office/drawing/2014/main" id="{5921E98B-0DD7-40EF-87E0-5D235D17ADB9}"/>
               </a:ext>
             </a:extLst>
           </p:cNvPr>
@@ -13015,7 +13168,7 @@
           <p:cNvPr id="25" name="Google Shape;887;p73">
             <a:extLst>
               <a:ext uri="{FF2B5EF4-FFF2-40B4-BE49-F238E27FC236}">
-                <a16:creationId xmlns:a16="http://schemas.microsoft.com/office/drawing/2014/main" xmlns="" id="{AA2C1B67-D26B-4635-8D6D-F5E403CA61FB}"/>
+                <a16:creationId xmlns:a16="http://schemas.microsoft.com/office/drawing/2014/main" id="{AA2C1B67-D26B-4635-8D6D-F5E403CA61FB}"/>
               </a:ext>
             </a:extLst>
           </p:cNvPr>
@@ -13298,12 +13451,8 @@
           <a:p>
             <a:pPr algn="l"/>
             <a:r>
-              <a:rPr lang="pt-BR" sz="1600" dirty="0" smtClean="0"/>
-              <a:t>Júlia </a:t>
-            </a:r>
-            <a:r>
               <a:rPr lang="pt-BR" sz="1600" dirty="0"/>
-              <a:t>Budavicius</a:t>
+              <a:t>Júlia Budavicius</a:t>
             </a:r>
           </a:p>
         </p:txBody>
@@ -13313,7 +13462,7 @@
           <p:cNvPr id="28" name="Imagem 27" descr="Pessoa com cabelo roxo&#10;&#10;Descrição gerada automaticamente com confiança média">
             <a:extLst>
               <a:ext uri="{FF2B5EF4-FFF2-40B4-BE49-F238E27FC236}">
-                <a16:creationId xmlns:a16="http://schemas.microsoft.com/office/drawing/2014/main" xmlns="" id="{E0A9C958-8E14-45C9-9F27-A0DF71D15DB4}"/>
+                <a16:creationId xmlns:a16="http://schemas.microsoft.com/office/drawing/2014/main" id="{E0A9C958-8E14-45C9-9F27-A0DF71D15DB4}"/>
               </a:ext>
             </a:extLst>
           </p:cNvPr>
@@ -13343,7 +13492,7 @@
           <p:cNvPr id="29" name="Google Shape;894;p73">
             <a:extLst>
               <a:ext uri="{FF2B5EF4-FFF2-40B4-BE49-F238E27FC236}">
-                <a16:creationId xmlns:a16="http://schemas.microsoft.com/office/drawing/2014/main" xmlns="" id="{06280BD7-AA72-46ED-81BE-93081D5219F7}"/>
+                <a16:creationId xmlns:a16="http://schemas.microsoft.com/office/drawing/2014/main" id="{06280BD7-AA72-46ED-81BE-93081D5219F7}"/>
               </a:ext>
             </a:extLst>
           </p:cNvPr>
@@ -13397,7 +13546,7 @@
           <p:cNvPr id="30" name="Google Shape;889;p73">
             <a:extLst>
               <a:ext uri="{FF2B5EF4-FFF2-40B4-BE49-F238E27FC236}">
-                <a16:creationId xmlns:a16="http://schemas.microsoft.com/office/drawing/2014/main" xmlns="" id="{9B3D5A38-0CAF-4238-8C3F-10C385A83AB6}"/>
+                <a16:creationId xmlns:a16="http://schemas.microsoft.com/office/drawing/2014/main" id="{9B3D5A38-0CAF-4238-8C3F-10C385A83AB6}"/>
               </a:ext>
             </a:extLst>
           </p:cNvPr>
@@ -13691,7 +13840,7 @@
           <p:cNvPr id="31" name="Imagem 30" descr="Foto de rosto de pessoa visto de perto&#10;&#10;Descrição gerada automaticamente com confiança média">
             <a:extLst>
               <a:ext uri="{FF2B5EF4-FFF2-40B4-BE49-F238E27FC236}">
-                <a16:creationId xmlns:a16="http://schemas.microsoft.com/office/drawing/2014/main" xmlns="" id="{35436FC8-B467-4A32-9998-24CB24348A5A}"/>
+                <a16:creationId xmlns:a16="http://schemas.microsoft.com/office/drawing/2014/main" id="{35436FC8-B467-4A32-9998-24CB24348A5A}"/>
               </a:ext>
             </a:extLst>
           </p:cNvPr>
@@ -13721,7 +13870,7 @@
           <p:cNvPr id="32" name="Google Shape;892;p73">
             <a:extLst>
               <a:ext uri="{FF2B5EF4-FFF2-40B4-BE49-F238E27FC236}">
-                <a16:creationId xmlns:a16="http://schemas.microsoft.com/office/drawing/2014/main" xmlns="" id="{0539093D-FF4E-4B14-B1C2-80B1EE827D4A}"/>
+                <a16:creationId xmlns:a16="http://schemas.microsoft.com/office/drawing/2014/main" id="{0539093D-FF4E-4B14-B1C2-80B1EE827D4A}"/>
               </a:ext>
             </a:extLst>
           </p:cNvPr>
@@ -13771,7 +13920,7 @@
           <p:cNvPr id="33" name="Google Shape;887;p73">
             <a:extLst>
               <a:ext uri="{FF2B5EF4-FFF2-40B4-BE49-F238E27FC236}">
-                <a16:creationId xmlns:a16="http://schemas.microsoft.com/office/drawing/2014/main" xmlns="" id="{D285D71E-6278-4663-852C-CC69E73C3EBF}"/>
+                <a16:creationId xmlns:a16="http://schemas.microsoft.com/office/drawing/2014/main" id="{D285D71E-6278-4663-852C-CC69E73C3EBF}"/>
               </a:ext>
             </a:extLst>
           </p:cNvPr>
@@ -14107,7 +14256,7 @@
           <p:cNvPr id="3" name="Imagem 2" descr="Linha do tempo&#10;&#10;Descrição gerada automaticamente">
             <a:extLst>
               <a:ext uri="{FF2B5EF4-FFF2-40B4-BE49-F238E27FC236}">
-                <a16:creationId xmlns:a16="http://schemas.microsoft.com/office/drawing/2014/main" xmlns="" id="{D52999EF-F20A-4E08-A1A5-628CC3076F53}"/>
+                <a16:creationId xmlns:a16="http://schemas.microsoft.com/office/drawing/2014/main" id="{D52999EF-F20A-4E08-A1A5-628CC3076F53}"/>
               </a:ext>
             </a:extLst>
           </p:cNvPr>
@@ -14179,7 +14328,7 @@
           <p:cNvPr id="21" name="Retângulo 20">
             <a:extLst>
               <a:ext uri="{FF2B5EF4-FFF2-40B4-BE49-F238E27FC236}">
-                <a16:creationId xmlns:a16="http://schemas.microsoft.com/office/drawing/2014/main" xmlns="" id="{7B938AF4-719E-4AB4-88BE-4357C82DF926}"/>
+                <a16:creationId xmlns:a16="http://schemas.microsoft.com/office/drawing/2014/main" id="{7B938AF4-719E-4AB4-88BE-4357C82DF926}"/>
               </a:ext>
             </a:extLst>
           </p:cNvPr>
@@ -14559,7 +14708,7 @@
           <p:cNvPr id="1026" name="Picture 2">
             <a:extLst>
               <a:ext uri="{FF2B5EF4-FFF2-40B4-BE49-F238E27FC236}">
-                <a16:creationId xmlns:a16="http://schemas.microsoft.com/office/drawing/2014/main" xmlns="" id="{E7C79143-28EE-4D5E-94D8-5FEA59D258F3}"/>
+                <a16:creationId xmlns:a16="http://schemas.microsoft.com/office/drawing/2014/main" id="{E7C79143-28EE-4D5E-94D8-5FEA59D258F3}"/>
               </a:ext>
             </a:extLst>
           </p:cNvPr>
@@ -14611,7 +14760,7 @@
           <p:cNvPr id="14" name="Text Box 11">
             <a:extLst>
               <a:ext uri="{FF2B5EF4-FFF2-40B4-BE49-F238E27FC236}">
-                <a16:creationId xmlns:a16="http://schemas.microsoft.com/office/drawing/2014/main" xmlns="" id="{435F1C02-2DE8-4823-AF55-31EB7DDA0B79}"/>
+                <a16:creationId xmlns:a16="http://schemas.microsoft.com/office/drawing/2014/main" id="{435F1C02-2DE8-4823-AF55-31EB7DDA0B79}"/>
               </a:ext>
             </a:extLst>
           </p:cNvPr>
@@ -14686,7 +14835,7 @@
           <p:cNvPr id="23" name="Google Shape;374;p44">
             <a:extLst>
               <a:ext uri="{FF2B5EF4-FFF2-40B4-BE49-F238E27FC236}">
-                <a16:creationId xmlns:a16="http://schemas.microsoft.com/office/drawing/2014/main" xmlns="" id="{2F33C80D-5F69-4325-9EED-F885BD6D4EA3}"/>
+                <a16:creationId xmlns:a16="http://schemas.microsoft.com/office/drawing/2014/main" id="{2F33C80D-5F69-4325-9EED-F885BD6D4EA3}"/>
               </a:ext>
             </a:extLst>
           </p:cNvPr>
@@ -14994,7 +15143,7 @@
           <p:cNvPr id="24" name="Google Shape;374;p44">
             <a:extLst>
               <a:ext uri="{FF2B5EF4-FFF2-40B4-BE49-F238E27FC236}">
-                <a16:creationId xmlns:a16="http://schemas.microsoft.com/office/drawing/2014/main" xmlns="" id="{4A5D79FB-B7F5-424E-958E-83CEEE54F1D2}"/>
+                <a16:creationId xmlns:a16="http://schemas.microsoft.com/office/drawing/2014/main" id="{4A5D79FB-B7F5-424E-958E-83CEEE54F1D2}"/>
               </a:ext>
             </a:extLst>
           </p:cNvPr>
@@ -15302,7 +15451,7 @@
           <p:cNvPr id="25" name="Google Shape;374;p44">
             <a:extLst>
               <a:ext uri="{FF2B5EF4-FFF2-40B4-BE49-F238E27FC236}">
-                <a16:creationId xmlns:a16="http://schemas.microsoft.com/office/drawing/2014/main" xmlns="" id="{21CC74BA-FCA9-4D81-AF53-EF1BDDAF993F}"/>
+                <a16:creationId xmlns:a16="http://schemas.microsoft.com/office/drawing/2014/main" id="{21CC74BA-FCA9-4D81-AF53-EF1BDDAF993F}"/>
               </a:ext>
             </a:extLst>
           </p:cNvPr>
@@ -15611,7 +15760,7 @@
           <p:cNvPr id="27" name="Google Shape;374;p44">
             <a:extLst>
               <a:ext uri="{FF2B5EF4-FFF2-40B4-BE49-F238E27FC236}">
-                <a16:creationId xmlns:a16="http://schemas.microsoft.com/office/drawing/2014/main" xmlns="" id="{F5A648B4-9982-4A73-94AB-5F308433C4AC}"/>
+                <a16:creationId xmlns:a16="http://schemas.microsoft.com/office/drawing/2014/main" id="{F5A648B4-9982-4A73-94AB-5F308433C4AC}"/>
               </a:ext>
             </a:extLst>
           </p:cNvPr>
@@ -15919,7 +16068,7 @@
           <p:cNvPr id="15" name="Imagem 14" descr="Desenho com traços pretos em fundo branco&#10;&#10;Descrição gerada automaticamente com confiança baixa">
             <a:extLst>
               <a:ext uri="{FF2B5EF4-FFF2-40B4-BE49-F238E27FC236}">
-                <a16:creationId xmlns:a16="http://schemas.microsoft.com/office/drawing/2014/main" xmlns="" id="{62430470-260F-42BC-97DA-B65C2CE3898C}"/>
+                <a16:creationId xmlns:a16="http://schemas.microsoft.com/office/drawing/2014/main" id="{62430470-260F-42BC-97DA-B65C2CE3898C}"/>
               </a:ext>
             </a:extLst>
           </p:cNvPr>
@@ -15986,7 +16135,7 @@
           <p:cNvPr id="6" name="Retângulo 5">
             <a:extLst>
               <a:ext uri="{FF2B5EF4-FFF2-40B4-BE49-F238E27FC236}">
-                <a16:creationId xmlns:a16="http://schemas.microsoft.com/office/drawing/2014/main" xmlns="" id="{42CCE9F3-2997-4665-9932-A81CB78FFD9C}"/>
+                <a16:creationId xmlns:a16="http://schemas.microsoft.com/office/drawing/2014/main" id="{42CCE9F3-2997-4665-9932-A81CB78FFD9C}"/>
               </a:ext>
             </a:extLst>
           </p:cNvPr>
@@ -16074,7 +16223,7 @@
           <p:cNvPr id="4" name="Imagem 3" descr="Desenho com traços pretos em fundo branco&#10;&#10;Descrição gerada automaticamente com confiança baixa">
             <a:extLst>
               <a:ext uri="{FF2B5EF4-FFF2-40B4-BE49-F238E27FC236}">
-                <a16:creationId xmlns:a16="http://schemas.microsoft.com/office/drawing/2014/main" xmlns="" id="{4D8FEDAC-3813-4084-9334-0DA2140347BE}"/>
+                <a16:creationId xmlns:a16="http://schemas.microsoft.com/office/drawing/2014/main" id="{4D8FEDAC-3813-4084-9334-0DA2140347BE}"/>
               </a:ext>
             </a:extLst>
           </p:cNvPr>
@@ -16104,7 +16253,7 @@
           <p:cNvPr id="2" name="Fluxograma: Armazenamento Interno 1">
             <a:extLst>
               <a:ext uri="{FF2B5EF4-FFF2-40B4-BE49-F238E27FC236}">
-                <a16:creationId xmlns:a16="http://schemas.microsoft.com/office/drawing/2014/main" xmlns="" id="{8C8C27EE-27AF-4727-ACD7-5DBB48B8489C}"/>
+                <a16:creationId xmlns:a16="http://schemas.microsoft.com/office/drawing/2014/main" id="{8C8C27EE-27AF-4727-ACD7-5DBB48B8489C}"/>
               </a:ext>
             </a:extLst>
           </p:cNvPr>
@@ -16266,7 +16415,7 @@
           <p:cNvPr id="9" name="Google Shape;417;p46">
             <a:extLst>
               <a:ext uri="{FF2B5EF4-FFF2-40B4-BE49-F238E27FC236}">
-                <a16:creationId xmlns:a16="http://schemas.microsoft.com/office/drawing/2014/main" xmlns="" id="{CB77E218-4C4B-4752-9724-0C29165E785A}"/>
+                <a16:creationId xmlns:a16="http://schemas.microsoft.com/office/drawing/2014/main" id="{CB77E218-4C4B-4752-9724-0C29165E785A}"/>
               </a:ext>
             </a:extLst>
           </p:cNvPr>
@@ -16568,7 +16717,7 @@
           <p:cNvPr id="13" name="Fluxograma: Armazenamento Interno 12">
             <a:extLst>
               <a:ext uri="{FF2B5EF4-FFF2-40B4-BE49-F238E27FC236}">
-                <a16:creationId xmlns:a16="http://schemas.microsoft.com/office/drawing/2014/main" xmlns="" id="{8802DC62-15A1-4456-8081-0685431C7D48}"/>
+                <a16:creationId xmlns:a16="http://schemas.microsoft.com/office/drawing/2014/main" id="{8802DC62-15A1-4456-8081-0685431C7D48}"/>
               </a:ext>
             </a:extLst>
           </p:cNvPr>
@@ -16730,7 +16879,7 @@
           <p:cNvPr id="14" name="Google Shape;417;p46">
             <a:extLst>
               <a:ext uri="{FF2B5EF4-FFF2-40B4-BE49-F238E27FC236}">
-                <a16:creationId xmlns:a16="http://schemas.microsoft.com/office/drawing/2014/main" xmlns="" id="{826FD412-A1C1-4ACC-9E7E-7084820E6AC6}"/>
+                <a16:creationId xmlns:a16="http://schemas.microsoft.com/office/drawing/2014/main" id="{826FD412-A1C1-4ACC-9E7E-7084820E6AC6}"/>
               </a:ext>
             </a:extLst>
           </p:cNvPr>
@@ -17074,7 +17223,7 @@
           <p:cNvPr id="7" name="Retângulo 6">
             <a:extLst>
               <a:ext uri="{FF2B5EF4-FFF2-40B4-BE49-F238E27FC236}">
-                <a16:creationId xmlns:a16="http://schemas.microsoft.com/office/drawing/2014/main" xmlns="" id="{6B01100F-B5E6-43F2-9776-A2050830B858}"/>
+                <a16:creationId xmlns:a16="http://schemas.microsoft.com/office/drawing/2014/main" id="{6B01100F-B5E6-43F2-9776-A2050830B858}"/>
               </a:ext>
             </a:extLst>
           </p:cNvPr>
@@ -17120,7 +17269,7 @@
           <p:cNvPr id="4" name="Imagem 3" descr="Desenho com traços pretos em fundo branco&#10;&#10;Descrição gerada automaticamente com confiança baixa">
             <a:extLst>
               <a:ext uri="{FF2B5EF4-FFF2-40B4-BE49-F238E27FC236}">
-                <a16:creationId xmlns:a16="http://schemas.microsoft.com/office/drawing/2014/main" xmlns="" id="{4D8FEDAC-3813-4084-9334-0DA2140347BE}"/>
+                <a16:creationId xmlns:a16="http://schemas.microsoft.com/office/drawing/2014/main" id="{4D8FEDAC-3813-4084-9334-0DA2140347BE}"/>
               </a:ext>
             </a:extLst>
           </p:cNvPr>
@@ -17150,7 +17299,7 @@
           <p:cNvPr id="10" name="Imagem 9" descr="Logotipo&#10;&#10;Descrição gerada automaticamente">
             <a:extLst>
               <a:ext uri="{FF2B5EF4-FFF2-40B4-BE49-F238E27FC236}">
-                <a16:creationId xmlns:a16="http://schemas.microsoft.com/office/drawing/2014/main" xmlns="" id="{5D3DE0BE-69EE-4B8E-80B2-F6B18548253F}"/>
+                <a16:creationId xmlns:a16="http://schemas.microsoft.com/office/drawing/2014/main" id="{5D3DE0BE-69EE-4B8E-80B2-F6B18548253F}"/>
               </a:ext>
             </a:extLst>
           </p:cNvPr>
@@ -17180,7 +17329,7 @@
           <p:cNvPr id="11" name="CaixaDeTexto 10">
             <a:extLst>
               <a:ext uri="{FF2B5EF4-FFF2-40B4-BE49-F238E27FC236}">
-                <a16:creationId xmlns:a16="http://schemas.microsoft.com/office/drawing/2014/main" xmlns="" id="{323481BB-041C-4A66-9771-857BA21CA2D7}"/>
+                <a16:creationId xmlns:a16="http://schemas.microsoft.com/office/drawing/2014/main" id="{323481BB-041C-4A66-9771-857BA21CA2D7}"/>
               </a:ext>
             </a:extLst>
           </p:cNvPr>
@@ -17270,7 +17419,7 @@
           <p:cNvPr id="21" name="Imagem 20" descr="Desenho com traços pretos em fundo branco&#10;&#10;Descrição gerada automaticamente com confiança baixa">
             <a:extLst>
               <a:ext uri="{FF2B5EF4-FFF2-40B4-BE49-F238E27FC236}">
-                <a16:creationId xmlns:a16="http://schemas.microsoft.com/office/drawing/2014/main" xmlns="" id="{23EDA186-09B1-46EA-B62A-18E3D84C1473}"/>
+                <a16:creationId xmlns:a16="http://schemas.microsoft.com/office/drawing/2014/main" id="{23EDA186-09B1-46EA-B62A-18E3D84C1473}"/>
               </a:ext>
             </a:extLst>
           </p:cNvPr>
@@ -17300,7 +17449,7 @@
           <p:cNvPr id="3" name="Título 2">
             <a:extLst>
               <a:ext uri="{FF2B5EF4-FFF2-40B4-BE49-F238E27FC236}">
-                <a16:creationId xmlns:a16="http://schemas.microsoft.com/office/drawing/2014/main" xmlns="" id="{8CA70183-A154-44A8-9ED0-7A342B243339}"/>
+                <a16:creationId xmlns:a16="http://schemas.microsoft.com/office/drawing/2014/main" id="{8CA70183-A154-44A8-9ED0-7A342B243339}"/>
               </a:ext>
             </a:extLst>
           </p:cNvPr>
@@ -17325,7 +17474,7 @@
           <p:cNvPr id="22" name="Imagem 21" descr="Interface gráfica do usuário, Aplicativo&#10;&#10;Descrição gerada automaticamente">
             <a:extLst>
               <a:ext uri="{FF2B5EF4-FFF2-40B4-BE49-F238E27FC236}">
-                <a16:creationId xmlns:a16="http://schemas.microsoft.com/office/drawing/2014/main" xmlns="" id="{61C8B5FA-6D89-4BDE-B2EF-4BF4F12ED340}"/>
+                <a16:creationId xmlns:a16="http://schemas.microsoft.com/office/drawing/2014/main" id="{61C8B5FA-6D89-4BDE-B2EF-4BF4F12ED340}"/>
               </a:ext>
             </a:extLst>
           </p:cNvPr>
@@ -17400,7 +17549,7 @@
           <p:cNvPr id="4" name="Retângulo 3">
             <a:extLst>
               <a:ext uri="{FF2B5EF4-FFF2-40B4-BE49-F238E27FC236}">
-                <a16:creationId xmlns:a16="http://schemas.microsoft.com/office/drawing/2014/main" xmlns="" id="{9E7A767D-7089-48B5-B2C9-07B484AC7577}"/>
+                <a16:creationId xmlns:a16="http://schemas.microsoft.com/office/drawing/2014/main" id="{9E7A767D-7089-48B5-B2C9-07B484AC7577}"/>
               </a:ext>
             </a:extLst>
           </p:cNvPr>
@@ -17645,7 +17794,7 @@
           <p:cNvPr id="3" name="Imagem 2">
             <a:extLst>
               <a:ext uri="{FF2B5EF4-FFF2-40B4-BE49-F238E27FC236}">
-                <a16:creationId xmlns:a16="http://schemas.microsoft.com/office/drawing/2014/main" xmlns="" id="{DD6EA363-A002-4559-9448-FBE9D6E67C93}"/>
+                <a16:creationId xmlns:a16="http://schemas.microsoft.com/office/drawing/2014/main" id="{DD6EA363-A002-4559-9448-FBE9D6E67C93}"/>
               </a:ext>
             </a:extLst>
           </p:cNvPr>
@@ -17675,7 +17824,7 @@
           <p:cNvPr id="9" name="Imagem 8" descr="Desenho com traços pretos em fundo branco&#10;&#10;Descrição gerada automaticamente com confiança baixa">
             <a:extLst>
               <a:ext uri="{FF2B5EF4-FFF2-40B4-BE49-F238E27FC236}">
-                <a16:creationId xmlns:a16="http://schemas.microsoft.com/office/drawing/2014/main" xmlns="" id="{913DED4F-9272-43AC-A541-ABDBFDDA508D}"/>
+                <a16:creationId xmlns:a16="http://schemas.microsoft.com/office/drawing/2014/main" id="{913DED4F-9272-43AC-A541-ABDBFDDA508D}"/>
               </a:ext>
             </a:extLst>
           </p:cNvPr>
@@ -18012,7 +18161,7 @@
           <p:cNvPr id="8" name="Imagem 7">
             <a:extLst>
               <a:ext uri="{FF2B5EF4-FFF2-40B4-BE49-F238E27FC236}">
-                <a16:creationId xmlns:a16="http://schemas.microsoft.com/office/drawing/2014/main" xmlns="" id="{C3BB9D16-CEFD-44A4-AEED-C0E24B505976}"/>
+                <a16:creationId xmlns:a16="http://schemas.microsoft.com/office/drawing/2014/main" id="{C3BB9D16-CEFD-44A4-AEED-C0E24B505976}"/>
               </a:ext>
             </a:extLst>
           </p:cNvPr>
@@ -18042,7 +18191,7 @@
           <p:cNvPr id="9" name="Imagem 8" descr="Desenho com traços pretos em fundo branco&#10;&#10;Descrição gerada automaticamente com confiança baixa">
             <a:extLst>
               <a:ext uri="{FF2B5EF4-FFF2-40B4-BE49-F238E27FC236}">
-                <a16:creationId xmlns:a16="http://schemas.microsoft.com/office/drawing/2014/main" xmlns="" id="{F181E95B-B182-4EB0-B67D-FAF4D35D477B}"/>
+                <a16:creationId xmlns:a16="http://schemas.microsoft.com/office/drawing/2014/main" id="{F181E95B-B182-4EB0-B67D-FAF4D35D477B}"/>
               </a:ext>
             </a:extLst>
           </p:cNvPr>

</xml_diff>